<commit_message>
updated model diagram and undo sd
</commit_message>
<xml_diff>
--- a/docs/diagrams/ModelComponentClassDiagram.pptx
+++ b/docs/diagrams/ModelComponentClassDiagram.pptx
@@ -208,7 +208,7 @@
           <a:p>
             <a:fld id="{F5CC4B3F-88C1-4FFA-B1B6-F41C21DC6924}" type="datetimeFigureOut">
               <a:rPr lang="en-US" smtClean="0"/>
-              <a:t>3/30/17</a:t>
+              <a:t>3/31/17</a:t>
             </a:fld>
             <a:endParaRPr lang="en-US" dirty="0"/>
           </a:p>
@@ -654,7 +654,7 @@
           <a:p>
             <a:fld id="{78C97017-6FC3-485B-9764-EAC9E56C1D49}" type="datetimeFigureOut">
               <a:rPr lang="en-US" smtClean="0"/>
-              <a:t>3/30/17</a:t>
+              <a:t>3/31/17</a:t>
             </a:fld>
             <a:endParaRPr lang="en-US" dirty="0"/>
           </a:p>
@@ -822,7 +822,7 @@
           <a:p>
             <a:fld id="{78C97017-6FC3-485B-9764-EAC9E56C1D49}" type="datetimeFigureOut">
               <a:rPr lang="en-US" smtClean="0"/>
-              <a:t>3/30/17</a:t>
+              <a:t>3/31/17</a:t>
             </a:fld>
             <a:endParaRPr lang="en-US" dirty="0"/>
           </a:p>
@@ -1000,7 +1000,7 @@
           <a:p>
             <a:fld id="{78C97017-6FC3-485B-9764-EAC9E56C1D49}" type="datetimeFigureOut">
               <a:rPr lang="en-US" smtClean="0"/>
-              <a:t>3/30/17</a:t>
+              <a:t>3/31/17</a:t>
             </a:fld>
             <a:endParaRPr lang="en-US" dirty="0"/>
           </a:p>
@@ -1168,7 +1168,7 @@
           <a:p>
             <a:fld id="{78C97017-6FC3-485B-9764-EAC9E56C1D49}" type="datetimeFigureOut">
               <a:rPr lang="en-US" smtClean="0"/>
-              <a:t>3/30/17</a:t>
+              <a:t>3/31/17</a:t>
             </a:fld>
             <a:endParaRPr lang="en-US" dirty="0"/>
           </a:p>
@@ -1413,7 +1413,7 @@
           <a:p>
             <a:fld id="{78C97017-6FC3-485B-9764-EAC9E56C1D49}" type="datetimeFigureOut">
               <a:rPr lang="en-US" smtClean="0"/>
-              <a:t>3/30/17</a:t>
+              <a:t>3/31/17</a:t>
             </a:fld>
             <a:endParaRPr lang="en-US" dirty="0"/>
           </a:p>
@@ -1698,7 +1698,7 @@
           <a:p>
             <a:fld id="{78C97017-6FC3-485B-9764-EAC9E56C1D49}" type="datetimeFigureOut">
               <a:rPr lang="en-US" smtClean="0"/>
-              <a:t>3/30/17</a:t>
+              <a:t>3/31/17</a:t>
             </a:fld>
             <a:endParaRPr lang="en-US" dirty="0"/>
           </a:p>
@@ -2117,7 +2117,7 @@
           <a:p>
             <a:fld id="{78C97017-6FC3-485B-9764-EAC9E56C1D49}" type="datetimeFigureOut">
               <a:rPr lang="en-US" smtClean="0"/>
-              <a:t>3/30/17</a:t>
+              <a:t>3/31/17</a:t>
             </a:fld>
             <a:endParaRPr lang="en-US" dirty="0"/>
           </a:p>
@@ -2234,7 +2234,7 @@
           <a:p>
             <a:fld id="{78C97017-6FC3-485B-9764-EAC9E56C1D49}" type="datetimeFigureOut">
               <a:rPr lang="en-US" smtClean="0"/>
-              <a:t>3/30/17</a:t>
+              <a:t>3/31/17</a:t>
             </a:fld>
             <a:endParaRPr lang="en-US" dirty="0"/>
           </a:p>
@@ -2329,7 +2329,7 @@
           <a:p>
             <a:fld id="{78C97017-6FC3-485B-9764-EAC9E56C1D49}" type="datetimeFigureOut">
               <a:rPr lang="en-US" smtClean="0"/>
-              <a:t>3/30/17</a:t>
+              <a:t>3/31/17</a:t>
             </a:fld>
             <a:endParaRPr lang="en-US" dirty="0"/>
           </a:p>
@@ -2604,7 +2604,7 @@
           <a:p>
             <a:fld id="{78C97017-6FC3-485B-9764-EAC9E56C1D49}" type="datetimeFigureOut">
               <a:rPr lang="en-US" smtClean="0"/>
-              <a:t>3/30/17</a:t>
+              <a:t>3/31/17</a:t>
             </a:fld>
             <a:endParaRPr lang="en-US" dirty="0"/>
           </a:p>
@@ -2856,7 +2856,7 @@
           <a:p>
             <a:fld id="{78C97017-6FC3-485B-9764-EAC9E56C1D49}" type="datetimeFigureOut">
               <a:rPr lang="en-US" smtClean="0"/>
-              <a:t>3/30/17</a:t>
+              <a:t>3/31/17</a:t>
             </a:fld>
             <a:endParaRPr lang="en-US" dirty="0"/>
           </a:p>
@@ -3067,7 +3067,7 @@
           <a:p>
             <a:fld id="{78C97017-6FC3-485B-9764-EAC9E56C1D49}" type="datetimeFigureOut">
               <a:rPr lang="en-US" smtClean="0"/>
-              <a:t>3/30/17</a:t>
+              <a:t>3/31/17</a:t>
             </a:fld>
             <a:endParaRPr lang="en-US" dirty="0"/>
           </a:p>
@@ -3511,7 +3511,7 @@
         </p:nvSpPr>
         <p:spPr>
           <a:xfrm>
-            <a:off x="2877180" y="3158440"/>
+            <a:off x="2805054" y="3158833"/>
             <a:ext cx="1093635" cy="346760"/>
           </a:xfrm>
           <a:prstGeom prst="rect">
@@ -3631,7 +3631,7 @@
         </p:nvCxnSpPr>
         <p:spPr>
           <a:xfrm flipV="1">
-            <a:off x="6477000" y="3194131"/>
+            <a:off x="6454480" y="3119747"/>
             <a:ext cx="95385" cy="416514"/>
           </a:xfrm>
           <a:prstGeom prst="bentConnector2">
@@ -3673,12 +3673,12 @@
         </p:nvCxnSpPr>
         <p:spPr>
           <a:xfrm rot="5400000" flipH="1" flipV="1">
-            <a:off x="3803787" y="1631819"/>
-            <a:ext cx="1290975" cy="4436989"/>
+            <a:off x="3855866" y="1578297"/>
+            <a:ext cx="1292419" cy="4542590"/>
           </a:xfrm>
           <a:prstGeom prst="bentConnector3">
             <a:avLst>
-              <a:gd name="adj1" fmla="val -51554"/>
+              <a:gd name="adj1" fmla="val -53794"/>
             </a:avLst>
           </a:prstGeom>
           <a:ln w="19050">
@@ -3835,7 +3835,7 @@
         <p:spPr>
           <a:xfrm>
             <a:off x="2656370" y="3326536"/>
-            <a:ext cx="220810" cy="5284"/>
+            <a:ext cx="148684" cy="5677"/>
           </a:xfrm>
           <a:prstGeom prst="straightConnector1">
             <a:avLst/>
@@ -3872,7 +3872,7 @@
         </p:nvSpPr>
         <p:spPr>
           <a:xfrm rot="5400000" flipV="1">
-            <a:off x="6253986" y="3522883"/>
+            <a:off x="6231466" y="3448499"/>
             <a:ext cx="270504" cy="175523"/>
           </a:xfrm>
           <a:prstGeom prst="triangle">
@@ -4052,7 +4052,7 @@
         </p:nvSpPr>
         <p:spPr>
           <a:xfrm>
-            <a:off x="2879490" y="2627420"/>
+            <a:off x="3014312" y="2622136"/>
             <a:ext cx="1093635" cy="346760"/>
           </a:xfrm>
           <a:prstGeom prst="rect">
@@ -4112,7 +4112,7 @@
         <p:spPr>
           <a:xfrm>
             <a:off x="2658680" y="2795516"/>
-            <a:ext cx="220810" cy="5284"/>
+            <a:ext cx="355632" cy="0"/>
           </a:xfrm>
           <a:prstGeom prst="straightConnector1">
             <a:avLst/>
@@ -4194,7 +4194,7 @@
         </p:nvSpPr>
         <p:spPr>
           <a:xfrm>
-            <a:off x="4487017" y="2847371"/>
+            <a:off x="4731061" y="2683242"/>
             <a:ext cx="1156969" cy="346760"/>
           </a:xfrm>
           <a:prstGeom prst="rect">
@@ -4250,7 +4250,7 @@
         </p:nvSpPr>
         <p:spPr>
           <a:xfrm>
-            <a:off x="3984303" y="2673991"/>
+            <a:off x="4122142" y="2663281"/>
             <a:ext cx="236048" cy="173380"/>
           </a:xfrm>
           <a:prstGeom prst="flowChartDecision">
@@ -4300,11 +4300,13 @@
         </p:nvCxnSpPr>
         <p:spPr>
           <a:xfrm>
-            <a:off x="4220351" y="2760681"/>
-            <a:ext cx="266666" cy="260070"/>
+            <a:off x="4358190" y="2749971"/>
+            <a:ext cx="372871" cy="106651"/>
           </a:xfrm>
           <a:prstGeom prst="bentConnector3">
-            <a:avLst/>
+            <a:avLst>
+              <a:gd name="adj1" fmla="val 50000"/>
+            </a:avLst>
           </a:prstGeom>
           <a:ln w="19050">
             <a:solidFill>
@@ -4338,7 +4340,7 @@
         </p:nvSpPr>
         <p:spPr>
           <a:xfrm>
-            <a:off x="4477328" y="2280569"/>
+            <a:off x="4934483" y="2189165"/>
             <a:ext cx="1156969" cy="346760"/>
           </a:xfrm>
           <a:prstGeom prst="rect">
@@ -4397,8 +4399,8 @@
         </p:nvCxnSpPr>
         <p:spPr>
           <a:xfrm flipV="1">
-            <a:off x="4220351" y="2453949"/>
-            <a:ext cx="256977" cy="306732"/>
+            <a:off x="4358190" y="2362545"/>
+            <a:ext cx="576293" cy="387426"/>
           </a:xfrm>
           <a:prstGeom prst="bentConnector3">
             <a:avLst>
@@ -4437,7 +4439,7 @@
         </p:nvSpPr>
         <p:spPr>
           <a:xfrm>
-            <a:off x="6313677" y="2858066"/>
+            <a:off x="6419278" y="2856622"/>
             <a:ext cx="708186" cy="346760"/>
           </a:xfrm>
           <a:prstGeom prst="rect">
@@ -4493,7 +4495,7 @@
         </p:nvSpPr>
         <p:spPr>
           <a:xfrm>
-            <a:off x="5643227" y="2943979"/>
+            <a:off x="5910016" y="2781072"/>
             <a:ext cx="236048" cy="173380"/>
           </a:xfrm>
           <a:prstGeom prst="flowChartDecision">
@@ -4541,8 +4543,8 @@
         </p:nvCxnSpPr>
         <p:spPr>
           <a:xfrm>
-            <a:off x="5879275" y="3030669"/>
-            <a:ext cx="434402" cy="777"/>
+            <a:off x="6146064" y="2867762"/>
+            <a:ext cx="273214" cy="162240"/>
           </a:xfrm>
           <a:prstGeom prst="bentConnector3">
             <a:avLst/>
@@ -4579,7 +4581,7 @@
         </p:nvSpPr>
         <p:spPr>
           <a:xfrm>
-            <a:off x="5336104" y="1809332"/>
+            <a:off x="5377392" y="1581383"/>
             <a:ext cx="799151" cy="346760"/>
           </a:xfrm>
           <a:prstGeom prst="rect">
@@ -4635,7 +4637,7 @@
         </p:nvSpPr>
         <p:spPr>
           <a:xfrm rot="16200000">
-            <a:off x="4921666" y="2066540"/>
+            <a:off x="4924224" y="1948282"/>
             <a:ext cx="236048" cy="173380"/>
           </a:xfrm>
           <a:prstGeom prst="flowChartDecision">
@@ -4684,8 +4686,8 @@
         </p:nvCxnSpPr>
         <p:spPr>
           <a:xfrm rot="5400000" flipH="1" flipV="1">
-            <a:off x="5161650" y="1860752"/>
-            <a:ext cx="52494" cy="296414"/>
+            <a:off x="5128728" y="1668284"/>
+            <a:ext cx="162185" cy="335144"/>
           </a:xfrm>
           <a:prstGeom prst="bentConnector2">
             <a:avLst/>
@@ -4722,7 +4724,7 @@
         </p:nvSpPr>
         <p:spPr>
           <a:xfrm>
-            <a:off x="5128257" y="3429000"/>
+            <a:off x="5114471" y="3348939"/>
             <a:ext cx="1156969" cy="346760"/>
           </a:xfrm>
           <a:prstGeom prst="rect">
@@ -4793,7 +4795,7 @@
         </p:nvSpPr>
         <p:spPr>
           <a:xfrm>
-            <a:off x="7712396" y="2564238"/>
+            <a:off x="7801419" y="2567327"/>
             <a:ext cx="776557" cy="285783"/>
           </a:xfrm>
           <a:prstGeom prst="rect">
@@ -4849,7 +4851,7 @@
         </p:nvSpPr>
         <p:spPr>
           <a:xfrm>
-            <a:off x="7041947" y="2948201"/>
+            <a:off x="7127703" y="2972174"/>
             <a:ext cx="236048" cy="173380"/>
           </a:xfrm>
           <a:prstGeom prst="flowChartDecision">
@@ -4893,15 +4895,14 @@
           <p:cNvPr id="79" name="Elbow Connector 78"/>
           <p:cNvCxnSpPr>
             <a:cxnSpLocks/>
-            <a:stCxn id="78" idx="3"/>
             <a:endCxn id="76" idx="1"/>
           </p:cNvCxnSpPr>
           <p:nvPr/>
         </p:nvCxnSpPr>
         <p:spPr>
           <a:xfrm flipV="1">
-            <a:off x="7277995" y="2707130"/>
-            <a:ext cx="434401" cy="327761"/>
+            <a:off x="7363751" y="2710219"/>
+            <a:ext cx="437668" cy="351734"/>
           </a:xfrm>
           <a:prstGeom prst="bentConnector3">
             <a:avLst/>
@@ -4938,7 +4939,7 @@
         </p:nvSpPr>
         <p:spPr>
           <a:xfrm>
-            <a:off x="7712396" y="2887216"/>
+            <a:off x="7801419" y="2890305"/>
             <a:ext cx="776557" cy="285783"/>
           </a:xfrm>
           <a:prstGeom prst="rect">
@@ -4991,15 +4992,14 @@
           <p:cNvPr id="81" name="Elbow Connector 80"/>
           <p:cNvCxnSpPr>
             <a:cxnSpLocks/>
-            <a:stCxn id="78" idx="3"/>
             <a:endCxn id="80" idx="1"/>
           </p:cNvCxnSpPr>
           <p:nvPr/>
         </p:nvCxnSpPr>
         <p:spPr>
           <a:xfrm flipV="1">
-            <a:off x="7277995" y="3030108"/>
-            <a:ext cx="434401" cy="4783"/>
+            <a:off x="7363751" y="3033197"/>
+            <a:ext cx="437668" cy="28756"/>
           </a:xfrm>
           <a:prstGeom prst="bentConnector3">
             <a:avLst/>
@@ -5036,7 +5036,7 @@
         </p:nvSpPr>
         <p:spPr>
           <a:xfrm>
-            <a:off x="7712396" y="3210194"/>
+            <a:off x="7801419" y="3213283"/>
             <a:ext cx="776557" cy="285783"/>
           </a:xfrm>
           <a:prstGeom prst="rect">
@@ -5089,15 +5089,14 @@
           <p:cNvPr id="84" name="Elbow Connector 83"/>
           <p:cNvCxnSpPr>
             <a:cxnSpLocks/>
-            <a:stCxn id="78" idx="3"/>
             <a:endCxn id="83" idx="1"/>
           </p:cNvCxnSpPr>
           <p:nvPr/>
         </p:nvCxnSpPr>
         <p:spPr>
           <a:xfrm>
-            <a:off x="7277995" y="3034891"/>
-            <a:ext cx="434401" cy="318195"/>
+            <a:off x="7363751" y="3061953"/>
+            <a:ext cx="437668" cy="294222"/>
           </a:xfrm>
           <a:prstGeom prst="bentConnector3">
             <a:avLst/>
@@ -5134,7 +5133,7 @@
         </p:nvSpPr>
         <p:spPr>
           <a:xfrm>
-            <a:off x="7712396" y="3533171"/>
+            <a:off x="7801419" y="3536260"/>
             <a:ext cx="776557" cy="285783"/>
           </a:xfrm>
           <a:prstGeom prst="rect">
@@ -5187,15 +5186,14 @@
           <p:cNvPr id="86" name="Elbow Connector 85"/>
           <p:cNvCxnSpPr>
             <a:cxnSpLocks/>
-            <a:stCxn id="78" idx="3"/>
             <a:endCxn id="85" idx="1"/>
           </p:cNvCxnSpPr>
           <p:nvPr/>
         </p:nvCxnSpPr>
         <p:spPr>
           <a:xfrm>
-            <a:off x="7277995" y="3034891"/>
-            <a:ext cx="434401" cy="641172"/>
+            <a:off x="7363751" y="3061953"/>
+            <a:ext cx="437668" cy="617199"/>
           </a:xfrm>
           <a:prstGeom prst="bentConnector3">
             <a:avLst/>
@@ -5549,8 +5547,8 @@
         </p:nvCxnSpPr>
         <p:spPr>
           <a:xfrm rot="16200000" flipV="1">
-            <a:off x="5948976" y="2139271"/>
-            <a:ext cx="404117" cy="1033473"/>
+            <a:off x="6185374" y="2268624"/>
+            <a:ext cx="494077" cy="681919"/>
           </a:xfrm>
           <a:prstGeom prst="bentConnector2">
             <a:avLst/>
@@ -5587,8 +5585,8 @@
         </p:nvSpPr>
         <p:spPr>
           <a:xfrm>
-            <a:off x="4324972" y="2191228"/>
-            <a:ext cx="189257" cy="178683"/>
+            <a:off x="4719652" y="2057400"/>
+            <a:ext cx="189258" cy="178683"/>
           </a:xfrm>
           <a:prstGeom prst="rect">
             <a:avLst/>
@@ -5626,7 +5624,7 @@
         </p:nvSpPr>
         <p:spPr>
           <a:xfrm>
-            <a:off x="4324972" y="3058864"/>
+            <a:off x="4535143" y="2895600"/>
             <a:ext cx="189257" cy="178683"/>
           </a:xfrm>
           <a:prstGeom prst="rect">
@@ -5665,7 +5663,7 @@
         </p:nvSpPr>
         <p:spPr>
           <a:xfrm>
-            <a:off x="5689761" y="2495413"/>
+            <a:off x="6172200" y="2133600"/>
             <a:ext cx="189257" cy="178683"/>
           </a:xfrm>
           <a:prstGeom prst="rect">
@@ -5860,7 +5858,7 @@
         </p:nvSpPr>
         <p:spPr>
           <a:xfrm>
-            <a:off x="6667770" y="3210194"/>
+            <a:off x="7010400" y="3250317"/>
             <a:ext cx="189257" cy="178683"/>
           </a:xfrm>
           <a:prstGeom prst="rect">
@@ -5876,7 +5874,7 @@
           <a:p>
             <a:pPr algn="ctr"/>
             <a:r>
-              <a:rPr lang="en-US" sz="1100" dirty="0">
+              <a:rPr lang="en-US" sz="1100" smtClean="0">
                 <a:solidFill>
                   <a:srgbClr val="7030A0"/>
                 </a:solidFill>
@@ -5899,7 +5897,7 @@
         </p:nvSpPr>
         <p:spPr>
           <a:xfrm>
-            <a:off x="7713955" y="3851528"/>
+            <a:off x="7802978" y="3854617"/>
             <a:ext cx="776557" cy="285783"/>
           </a:xfrm>
           <a:prstGeom prst="rect">
@@ -5955,7 +5953,7 @@
         </p:nvSpPr>
         <p:spPr>
           <a:xfrm>
-            <a:off x="7710786" y="1925054"/>
+            <a:off x="7799809" y="1928143"/>
             <a:ext cx="776557" cy="285783"/>
           </a:xfrm>
           <a:prstGeom prst="rect">
@@ -6011,7 +6009,7 @@
         </p:nvSpPr>
         <p:spPr>
           <a:xfrm>
-            <a:off x="7710786" y="2248031"/>
+            <a:off x="7799809" y="2251120"/>
             <a:ext cx="776557" cy="285783"/>
           </a:xfrm>
           <a:prstGeom prst="rect">
@@ -6069,7 +6067,7 @@
         </p:nvCxnSpPr>
         <p:spPr>
           <a:xfrm rot="5400000" flipH="1" flipV="1">
-            <a:off x="7278615" y="2284526"/>
+            <a:off x="7367638" y="2287615"/>
             <a:ext cx="648750" cy="215591"/>
           </a:xfrm>
           <a:prstGeom prst="bentConnector2">
@@ -6108,7 +6106,7 @@
         </p:nvCxnSpPr>
         <p:spPr>
           <a:xfrm rot="5400000" flipH="1" flipV="1">
-            <a:off x="7294626" y="2591491"/>
+            <a:off x="7383649" y="2594580"/>
             <a:ext cx="616727" cy="215593"/>
           </a:xfrm>
           <a:prstGeom prst="bentConnector2">
@@ -6147,7 +6145,7 @@
         </p:nvCxnSpPr>
         <p:spPr>
           <a:xfrm rot="16200000" flipH="1">
-            <a:off x="7257134" y="3537598"/>
+            <a:off x="7346157" y="3540687"/>
             <a:ext cx="694883" cy="218760"/>
           </a:xfrm>
           <a:prstGeom prst="bentConnector2">
@@ -6183,8 +6181,8 @@
         </p:nvSpPr>
         <p:spPr>
           <a:xfrm>
-            <a:off x="2877180" y="3705882"/>
-            <a:ext cx="1839043" cy="346760"/>
+            <a:off x="2785804" y="4310062"/>
+            <a:ext cx="1683219" cy="346760"/>
           </a:xfrm>
           <a:prstGeom prst="rect">
             <a:avLst/>
@@ -6221,7 +6219,7 @@
                   <a:srgbClr val="7030A0"/>
                 </a:solidFill>
               </a:rPr>
-              <a:t>UndoRedoOperationManager</a:t>
+              <a:t>UndoRedoOperationCentre</a:t>
             </a:r>
             <a:endParaRPr lang="en-SG" sz="1050" dirty="0">
               <a:solidFill>
@@ -6239,7 +6237,7 @@
         </p:nvSpPr>
         <p:spPr>
           <a:xfrm>
-            <a:off x="2409328" y="3788103"/>
+            <a:off x="2411955" y="4376347"/>
             <a:ext cx="236048" cy="173380"/>
           </a:xfrm>
           <a:prstGeom prst="flowChartDecision">
@@ -6287,8 +6285,8 @@
         </p:nvCxnSpPr>
         <p:spPr>
           <a:xfrm>
-            <a:off x="2645376" y="3874793"/>
-            <a:ext cx="231804" cy="4469"/>
+            <a:off x="2648003" y="4463037"/>
+            <a:ext cx="137801" cy="20405"/>
           </a:xfrm>
           <a:prstGeom prst="straightConnector1">
             <a:avLst/>
@@ -6325,7 +6323,7 @@
         </p:nvSpPr>
         <p:spPr>
           <a:xfrm>
-            <a:off x="2669089" y="3636785"/>
+            <a:off x="2630143" y="4164717"/>
             <a:ext cx="189257" cy="178683"/>
           </a:xfrm>
           <a:prstGeom prst="rect">
@@ -6356,6 +6354,500 @@
           </a:p>
         </p:txBody>
       </p:sp>
+      <p:cxnSp>
+        <p:nvCxnSpPr>
+          <p:cNvPr id="41" name="Straight Arrow Connector 40"/>
+          <p:cNvCxnSpPr>
+            <a:stCxn id="103" idx="0"/>
+            <a:endCxn id="98" idx="2"/>
+          </p:cNvCxnSpPr>
+          <p:nvPr/>
+        </p:nvCxnSpPr>
+        <p:spPr>
+          <a:xfrm flipH="1" flipV="1">
+            <a:off x="3618626" y="4131887"/>
+            <a:ext cx="8788" cy="178175"/>
+          </a:xfrm>
+          <a:prstGeom prst="straightConnector1">
+            <a:avLst/>
+          </a:prstGeom>
+          <a:ln w="19050">
+            <a:solidFill>
+              <a:srgbClr val="7030A0"/>
+            </a:solidFill>
+            <a:prstDash val="sysDot"/>
+            <a:headEnd type="none"/>
+            <a:tailEnd type="arrow"/>
+          </a:ln>
+        </p:spPr>
+        <p:style>
+          <a:lnRef idx="1">
+            <a:schemeClr val="accent1"/>
+          </a:lnRef>
+          <a:fillRef idx="0">
+            <a:schemeClr val="accent1"/>
+          </a:fillRef>
+          <a:effectRef idx="0">
+            <a:schemeClr val="accent1"/>
+          </a:effectRef>
+          <a:fontRef idx="minor">
+            <a:schemeClr val="tx1"/>
+          </a:fontRef>
+        </p:style>
+      </p:cxnSp>
+      <p:sp>
+        <p:nvSpPr>
+          <p:cNvPr id="98" name="Rectangle 8"/>
+          <p:cNvSpPr/>
+          <p:nvPr/>
+        </p:nvSpPr>
+        <p:spPr>
+          <a:xfrm>
+            <a:off x="3071808" y="3785127"/>
+            <a:ext cx="1093635" cy="346760"/>
+          </a:xfrm>
+          <a:prstGeom prst="rect">
+            <a:avLst/>
+          </a:prstGeom>
+          <a:ln w="19050">
+            <a:solidFill>
+              <a:srgbClr val="7030A0"/>
+            </a:solidFill>
+          </a:ln>
+          <a:effectLst/>
+        </p:spPr>
+        <p:style>
+          <a:lnRef idx="1">
+            <a:schemeClr val="accent4"/>
+          </a:lnRef>
+          <a:fillRef idx="2">
+            <a:schemeClr val="accent4"/>
+          </a:fillRef>
+          <a:effectRef idx="1">
+            <a:schemeClr val="accent4"/>
+          </a:effectRef>
+          <a:fontRef idx="minor">
+            <a:schemeClr val="dk1"/>
+          </a:fontRef>
+        </p:style>
+        <p:txBody>
+          <a:bodyPr rtlCol="0" anchor="ctr"/>
+          <a:lstStyle/>
+          <a:p>
+            <a:pPr algn="ctr"/>
+            <a:r>
+              <a:rPr lang="en-US" sz="1050" smtClean="0">
+                <a:solidFill>
+                  <a:srgbClr val="7030A0"/>
+                </a:solidFill>
+              </a:rPr>
+              <a:t>{abstract}</a:t>
+            </a:r>
+          </a:p>
+          <a:p>
+            <a:pPr algn="ctr"/>
+            <a:r>
+              <a:rPr lang="en-US" sz="1050" dirty="0" smtClean="0">
+                <a:solidFill>
+                  <a:srgbClr val="7030A0"/>
+                </a:solidFill>
+              </a:rPr>
+              <a:t>Operations</a:t>
+            </a:r>
+            <a:endParaRPr lang="en-SG" sz="1050" dirty="0">
+              <a:solidFill>
+                <a:srgbClr val="7030A0"/>
+              </a:solidFill>
+            </a:endParaRPr>
+          </a:p>
+        </p:txBody>
+      </p:sp>
+      <p:sp>
+        <p:nvSpPr>
+          <p:cNvPr id="101" name="Isosceles Triangle 102"/>
+          <p:cNvSpPr/>
+          <p:nvPr/>
+        </p:nvSpPr>
+        <p:spPr>
+          <a:xfrm rot="5400000" flipV="1">
+            <a:off x="4122528" y="3908873"/>
+            <a:ext cx="270504" cy="175523"/>
+          </a:xfrm>
+          <a:prstGeom prst="triangle">
+            <a:avLst/>
+          </a:prstGeom>
+          <a:gradFill flip="none" rotWithShape="1">
+            <a:gsLst>
+              <a:gs pos="0">
+                <a:srgbClr val="7030A0">
+                  <a:tint val="66000"/>
+                  <a:satMod val="160000"/>
+                </a:srgbClr>
+              </a:gs>
+              <a:gs pos="50000">
+                <a:srgbClr val="7030A0">
+                  <a:tint val="44500"/>
+                  <a:satMod val="160000"/>
+                </a:srgbClr>
+              </a:gs>
+              <a:gs pos="100000">
+                <a:srgbClr val="7030A0">
+                  <a:tint val="23500"/>
+                  <a:satMod val="160000"/>
+                </a:srgbClr>
+              </a:gs>
+            </a:gsLst>
+            <a:lin ang="5400000" scaled="1"/>
+            <a:tileRect/>
+          </a:gradFill>
+          <a:ln w="19050">
+            <a:solidFill>
+              <a:srgbClr val="7030A0"/>
+            </a:solidFill>
+          </a:ln>
+          <a:effectLst/>
+        </p:spPr>
+        <p:style>
+          <a:lnRef idx="1">
+            <a:schemeClr val="accent1"/>
+          </a:lnRef>
+          <a:fillRef idx="2">
+            <a:schemeClr val="accent1"/>
+          </a:fillRef>
+          <a:effectRef idx="1">
+            <a:schemeClr val="accent1"/>
+          </a:effectRef>
+          <a:fontRef idx="minor">
+            <a:schemeClr val="dk1"/>
+          </a:fontRef>
+        </p:style>
+        <p:txBody>
+          <a:bodyPr rtlCol="0" anchor="ctr"/>
+          <a:lstStyle/>
+          <a:p>
+            <a:pPr algn="ctr"/>
+            <a:endParaRPr lang="en-SG" sz="1050" b="1">
+              <a:solidFill>
+                <a:srgbClr val="92D050"/>
+              </a:solidFill>
+            </a:endParaRPr>
+          </a:p>
+        </p:txBody>
+      </p:sp>
+      <p:cxnSp>
+        <p:nvCxnSpPr>
+          <p:cNvPr id="74" name="Elbow Connector 73"/>
+          <p:cNvCxnSpPr>
+            <a:stCxn id="101" idx="3"/>
+          </p:cNvCxnSpPr>
+          <p:nvPr/>
+        </p:nvCxnSpPr>
+        <p:spPr>
+          <a:xfrm>
+            <a:off x="4345542" y="3996635"/>
+            <a:ext cx="809849" cy="424064"/>
+          </a:xfrm>
+          <a:prstGeom prst="bentConnector3">
+            <a:avLst/>
+          </a:prstGeom>
+          <a:ln w="19050">
+            <a:solidFill>
+              <a:srgbClr val="7030A0"/>
+            </a:solidFill>
+          </a:ln>
+        </p:spPr>
+        <p:style>
+          <a:lnRef idx="1">
+            <a:schemeClr val="accent1"/>
+          </a:lnRef>
+          <a:fillRef idx="0">
+            <a:schemeClr val="accent1"/>
+          </a:fillRef>
+          <a:effectRef idx="0">
+            <a:schemeClr val="accent1"/>
+          </a:effectRef>
+          <a:fontRef idx="minor">
+            <a:schemeClr val="tx1"/>
+          </a:fontRef>
+        </p:style>
+      </p:cxnSp>
+      <p:cxnSp>
+        <p:nvCxnSpPr>
+          <p:cNvPr id="88" name="Elbow Connector 87"/>
+          <p:cNvCxnSpPr/>
+          <p:nvPr/>
+        </p:nvCxnSpPr>
+        <p:spPr>
+          <a:xfrm rot="16200000" flipH="1">
+            <a:off x="4574138" y="4199861"/>
+            <a:ext cx="796090" cy="439869"/>
+          </a:xfrm>
+          <a:prstGeom prst="bentConnector2">
+            <a:avLst/>
+          </a:prstGeom>
+          <a:ln w="19050">
+            <a:solidFill>
+              <a:srgbClr val="7030A0"/>
+            </a:solidFill>
+          </a:ln>
+        </p:spPr>
+        <p:style>
+          <a:lnRef idx="1">
+            <a:schemeClr val="accent1"/>
+          </a:lnRef>
+          <a:fillRef idx="0">
+            <a:schemeClr val="accent1"/>
+          </a:fillRef>
+          <a:effectRef idx="0">
+            <a:schemeClr val="accent1"/>
+          </a:effectRef>
+          <a:fontRef idx="minor">
+            <a:schemeClr val="tx1"/>
+          </a:fontRef>
+        </p:style>
+      </p:cxnSp>
+      <p:sp>
+        <p:nvSpPr>
+          <p:cNvPr id="116" name="Rectangle 8"/>
+          <p:cNvSpPr/>
+          <p:nvPr/>
+        </p:nvSpPr>
+        <p:spPr>
+          <a:xfrm>
+            <a:off x="5170930" y="3838675"/>
+            <a:ext cx="1123655" cy="346760"/>
+          </a:xfrm>
+          <a:prstGeom prst="rect">
+            <a:avLst/>
+          </a:prstGeom>
+          <a:ln w="19050">
+            <a:solidFill>
+              <a:srgbClr val="7030A0"/>
+            </a:solidFill>
+          </a:ln>
+          <a:effectLst/>
+        </p:spPr>
+        <p:style>
+          <a:lnRef idx="1">
+            <a:schemeClr val="accent4"/>
+          </a:lnRef>
+          <a:fillRef idx="2">
+            <a:schemeClr val="accent4"/>
+          </a:fillRef>
+          <a:effectRef idx="1">
+            <a:schemeClr val="accent4"/>
+          </a:effectRef>
+          <a:fontRef idx="minor">
+            <a:schemeClr val="dk1"/>
+          </a:fontRef>
+        </p:style>
+        <p:txBody>
+          <a:bodyPr rtlCol="0" anchor="ctr"/>
+          <a:lstStyle/>
+          <a:p>
+            <a:pPr algn="ctr"/>
+            <a:r>
+              <a:rPr lang="en-US" sz="900" dirty="0" err="1" smtClean="0">
+                <a:solidFill>
+                  <a:srgbClr val="7030A0"/>
+                </a:solidFill>
+              </a:rPr>
+              <a:t>UndoAddOperation</a:t>
+            </a:r>
+            <a:endParaRPr lang="en-SG" sz="900" dirty="0">
+              <a:solidFill>
+                <a:srgbClr val="7030A0"/>
+              </a:solidFill>
+            </a:endParaRPr>
+          </a:p>
+        </p:txBody>
+      </p:sp>
+      <p:sp>
+        <p:nvSpPr>
+          <p:cNvPr id="117" name="Rectangle 8"/>
+          <p:cNvSpPr/>
+          <p:nvPr/>
+        </p:nvSpPr>
+        <p:spPr>
+          <a:xfrm>
+            <a:off x="5172915" y="4246506"/>
+            <a:ext cx="1121670" cy="346760"/>
+          </a:xfrm>
+          <a:prstGeom prst="rect">
+            <a:avLst/>
+          </a:prstGeom>
+          <a:ln w="19050">
+            <a:solidFill>
+              <a:srgbClr val="7030A0"/>
+            </a:solidFill>
+          </a:ln>
+          <a:effectLst/>
+        </p:spPr>
+        <p:style>
+          <a:lnRef idx="1">
+            <a:schemeClr val="accent4"/>
+          </a:lnRef>
+          <a:fillRef idx="2">
+            <a:schemeClr val="accent4"/>
+          </a:fillRef>
+          <a:effectRef idx="1">
+            <a:schemeClr val="accent4"/>
+          </a:effectRef>
+          <a:fontRef idx="minor">
+            <a:schemeClr val="dk1"/>
+          </a:fontRef>
+        </p:style>
+        <p:txBody>
+          <a:bodyPr rtlCol="0" anchor="ctr"/>
+          <a:lstStyle/>
+          <a:p>
+            <a:pPr algn="ctr"/>
+            <a:r>
+              <a:rPr lang="en-US" sz="800" dirty="0" err="1" smtClean="0">
+                <a:solidFill>
+                  <a:srgbClr val="7030A0"/>
+                </a:solidFill>
+              </a:rPr>
+              <a:t>UndoDeleteOperation</a:t>
+            </a:r>
+            <a:endParaRPr lang="en-SG" sz="800" dirty="0">
+              <a:solidFill>
+                <a:srgbClr val="7030A0"/>
+              </a:solidFill>
+            </a:endParaRPr>
+          </a:p>
+        </p:txBody>
+      </p:sp>
+      <p:sp>
+        <p:nvSpPr>
+          <p:cNvPr id="121" name="Rectangle 8"/>
+          <p:cNvSpPr/>
+          <p:nvPr/>
+        </p:nvSpPr>
+        <p:spPr>
+          <a:xfrm>
+            <a:off x="5170930" y="4643598"/>
+            <a:ext cx="1093635" cy="346760"/>
+          </a:xfrm>
+          <a:prstGeom prst="rect">
+            <a:avLst/>
+          </a:prstGeom>
+          <a:ln w="19050">
+            <a:solidFill>
+              <a:srgbClr val="7030A0"/>
+            </a:solidFill>
+          </a:ln>
+          <a:effectLst/>
+        </p:spPr>
+        <p:style>
+          <a:lnRef idx="1">
+            <a:schemeClr val="accent4"/>
+          </a:lnRef>
+          <a:fillRef idx="2">
+            <a:schemeClr val="accent4"/>
+          </a:fillRef>
+          <a:effectRef idx="1">
+            <a:schemeClr val="accent4"/>
+          </a:effectRef>
+          <a:fontRef idx="minor">
+            <a:schemeClr val="dk1"/>
+          </a:fontRef>
+        </p:style>
+        <p:txBody>
+          <a:bodyPr rtlCol="0" anchor="ctr"/>
+          <a:lstStyle/>
+          <a:p>
+            <a:pPr algn="ctr"/>
+            <a:r>
+              <a:rPr lang="mr-IN" sz="1050" dirty="0" smtClean="0">
+                <a:solidFill>
+                  <a:srgbClr val="7030A0"/>
+                </a:solidFill>
+              </a:rPr>
+              <a:t>…</a:t>
+            </a:r>
+            <a:endParaRPr lang="en-SG" sz="1050" dirty="0">
+              <a:solidFill>
+                <a:srgbClr val="7030A0"/>
+              </a:solidFill>
+            </a:endParaRPr>
+          </a:p>
+        </p:txBody>
+      </p:sp>
+      <p:cxnSp>
+        <p:nvCxnSpPr>
+          <p:cNvPr id="158" name="Straight Connector 157"/>
+          <p:cNvCxnSpPr>
+            <a:endCxn id="116" idx="1"/>
+          </p:cNvCxnSpPr>
+          <p:nvPr/>
+        </p:nvCxnSpPr>
+        <p:spPr>
+          <a:xfrm>
+            <a:off x="4662893" y="4001759"/>
+            <a:ext cx="508037" cy="10296"/>
+          </a:xfrm>
+          <a:prstGeom prst="line">
+            <a:avLst/>
+          </a:prstGeom>
+          <a:ln w="19050">
+            <a:solidFill>
+              <a:srgbClr val="7030A0"/>
+            </a:solidFill>
+          </a:ln>
+        </p:spPr>
+        <p:style>
+          <a:lnRef idx="1">
+            <a:schemeClr val="accent1"/>
+          </a:lnRef>
+          <a:fillRef idx="0">
+            <a:schemeClr val="accent1"/>
+          </a:fillRef>
+          <a:effectRef idx="0">
+            <a:schemeClr val="accent1"/>
+          </a:effectRef>
+          <a:fontRef idx="minor">
+            <a:schemeClr val="tx1"/>
+          </a:fontRef>
+        </p:style>
+      </p:cxnSp>
+      <p:cxnSp>
+        <p:nvCxnSpPr>
+          <p:cNvPr id="184" name="Straight Arrow Connector 183"/>
+          <p:cNvCxnSpPr/>
+          <p:nvPr/>
+        </p:nvCxnSpPr>
+        <p:spPr>
+          <a:xfrm flipV="1">
+            <a:off x="3975692" y="2940915"/>
+            <a:ext cx="0" cy="857178"/>
+          </a:xfrm>
+          <a:prstGeom prst="straightConnector1">
+            <a:avLst/>
+          </a:prstGeom>
+          <a:ln w="19050">
+            <a:solidFill>
+              <a:srgbClr val="7030A0"/>
+            </a:solidFill>
+            <a:prstDash val="sysDot"/>
+            <a:tailEnd type="arrow"/>
+          </a:ln>
+        </p:spPr>
+        <p:style>
+          <a:lnRef idx="1">
+            <a:schemeClr val="accent1"/>
+          </a:lnRef>
+          <a:fillRef idx="0">
+            <a:schemeClr val="accent1"/>
+          </a:fillRef>
+          <a:effectRef idx="0">
+            <a:schemeClr val="accent1"/>
+          </a:effectRef>
+          <a:fontRef idx="minor">
+            <a:schemeClr val="tx1"/>
+          </a:fontRef>
+        </p:style>
+      </p:cxnSp>
     </p:spTree>
     <p:extLst>
       <p:ext uri="{BB962C8B-B14F-4D97-AF65-F5344CB8AC3E}">

</xml_diff>